<commit_message>
update some file paths
</commit_message>
<xml_diff>
--- a/Lessons/G_TimeSeries/A_TimeSeries.pptx
+++ b/Lessons/G_TimeSeries/A_TimeSeries.pptx
@@ -249,7 +249,7 @@
           <a:p>
             <a:fld id="{C63082B1-427E-41DB-ABE5-DAB9BFFC394E}" type="datetimeFigureOut">
               <a:rPr lang="en-US" smtClean="0"/>
-              <a:t>10/29/23</a:t>
+              <a:t>10/28/24</a:t>
             </a:fld>
             <a:endParaRPr lang="en-US"/>
           </a:p>
@@ -414,7 +414,7 @@
           <a:p>
             <a:fld id="{C333ABA6-B72D-4ED4-A6E7-13A0DAE65F1A}" type="datetimeFigureOut">
               <a:rPr lang="en-US" smtClean="0"/>
-              <a:t>10/29/23</a:t>
+              <a:t>10/28/24</a:t>
             </a:fld>
             <a:endParaRPr lang="en-US"/>
           </a:p>
@@ -1783,7 +1783,7 @@
           <a:p>
             <a:fld id="{5738B90E-0779-4C36-915C-6F05FCD89456}" type="datetime1">
               <a:rPr lang="en-US" smtClean="0"/>
-              <a:t>10/29/23</a:t>
+              <a:t>10/28/24</a:t>
             </a:fld>
             <a:endParaRPr lang="en-US"/>
           </a:p>
@@ -2001,7 +2001,7 @@
           <a:p>
             <a:fld id="{7B9EA29D-D431-42FE-B7B6-AAE4454C77D3}" type="datetime1">
               <a:rPr lang="en-US" smtClean="0"/>
-              <a:t>10/29/23</a:t>
+              <a:t>10/28/24</a:t>
             </a:fld>
             <a:endParaRPr lang="en-US"/>
           </a:p>
@@ -2261,7 +2261,7 @@
           <a:p>
             <a:fld id="{690D8A1E-EA8F-46C1-B891-AE0C00D9C314}" type="datetime1">
               <a:rPr lang="en-US" smtClean="0"/>
-              <a:t>10/29/23</a:t>
+              <a:t>10/28/24</a:t>
             </a:fld>
             <a:endParaRPr lang="en-US"/>
           </a:p>
@@ -2555,7 +2555,7 @@
           <a:p>
             <a:fld id="{D753EFC8-4232-4598-94F6-94C0EBAFC469}" type="datetime1">
               <a:rPr lang="en-US" smtClean="0"/>
-              <a:t>10/29/23</a:t>
+              <a:t>10/28/24</a:t>
             </a:fld>
             <a:endParaRPr lang="en-US"/>
           </a:p>
@@ -2870,7 +2870,7 @@
           <a:p>
             <a:fld id="{F3161074-1C18-4AE7-957D-F18524378C85}" type="datetime1">
               <a:rPr lang="en-US" smtClean="0"/>
-              <a:t>10/29/23</a:t>
+              <a:t>10/28/24</a:t>
             </a:fld>
             <a:endParaRPr lang="en-US"/>
           </a:p>
@@ -3144,7 +3144,7 @@
           <a:p>
             <a:fld id="{69BE256C-8D9A-4404-B47D-41A1AE514425}" type="datetime1">
               <a:rPr lang="en-US" smtClean="0"/>
-              <a:t>10/29/23</a:t>
+              <a:t>10/28/24</a:t>
             </a:fld>
             <a:endParaRPr lang="en-US"/>
           </a:p>
@@ -3578,7 +3578,7 @@
           <a:p>
             <a:fld id="{66CB2154-9035-4012-8189-BAAB61C5A5EE}" type="datetime1">
               <a:rPr lang="en-US" smtClean="0"/>
-              <a:t>10/29/23</a:t>
+              <a:t>10/28/24</a:t>
             </a:fld>
             <a:endParaRPr lang="en-US"/>
           </a:p>
@@ -3752,7 +3752,7 @@
           <a:p>
             <a:fld id="{6700A58B-DD98-43D0-B791-721480A02982}" type="datetime1">
               <a:rPr lang="en-US" smtClean="0"/>
-              <a:t>10/29/23</a:t>
+              <a:t>10/28/24</a:t>
             </a:fld>
             <a:endParaRPr lang="en-US"/>
           </a:p>
@@ -3944,7 +3944,7 @@
           <a:p>
             <a:fld id="{7DB6E382-4F61-4E24-BE1A-377EC83D0E3A}" type="datetime1">
               <a:rPr lang="en-US" smtClean="0"/>
-              <a:t>10/29/23</a:t>
+              <a:t>10/28/24</a:t>
             </a:fld>
             <a:endParaRPr lang="en-US"/>
           </a:p>
@@ -4255,7 +4255,7 @@
           <a:p>
             <a:fld id="{4142EED6-FC16-45B9-B8C4-2BC5DBA88325}" type="datetime1">
               <a:rPr lang="en-US" smtClean="0"/>
-              <a:t>10/29/23</a:t>
+              <a:t>10/28/24</a:t>
             </a:fld>
             <a:endParaRPr lang="en-US"/>
           </a:p>
@@ -4573,7 +4573,7 @@
           <a:p>
             <a:fld id="{DF59512B-4F1D-43D7-8819-2F53FEF69650}" type="datetime1">
               <a:rPr lang="en-US" smtClean="0"/>
-              <a:t>10/29/23</a:t>
+              <a:t>10/28/24</a:t>
             </a:fld>
             <a:endParaRPr lang="en-US"/>
           </a:p>
@@ -4849,7 +4849,7 @@
           <a:p>
             <a:fld id="{08437B94-E2BF-44DC-ADC5-B05FC9934E9D}" type="datetime1">
               <a:rPr lang="en-US" smtClean="0"/>
-              <a:t>10/29/23</a:t>
+              <a:t>10/28/24</a:t>
             </a:fld>
             <a:endParaRPr lang="en-US"/>
           </a:p>
@@ -5369,7 +5369,7 @@
           <a:p>
             <a:fld id="{F3161074-1C18-4AE7-957D-F18524378C85}" type="datetime1">
               <a:rPr lang="en-US" smtClean="0"/>
-              <a:t>10/29/23</a:t>
+              <a:t>10/28/24</a:t>
             </a:fld>
             <a:endParaRPr lang="en-US"/>
           </a:p>
@@ -5485,7 +5485,7 @@
           <a:p>
             <a:fld id="{6700A58B-DD98-43D0-B791-721480A02982}" type="datetime1">
               <a:rPr lang="en-US" smtClean="0"/>
-              <a:t>10/29/23</a:t>
+              <a:t>10/28/24</a:t>
             </a:fld>
             <a:endParaRPr lang="en-US"/>
           </a:p>
@@ -5987,7 +5987,7 @@
           <a:p>
             <a:fld id="{D753EFC8-4232-4598-94F6-94C0EBAFC469}" type="datetime1">
               <a:rPr lang="en-US" smtClean="0"/>
-              <a:t>10/29/23</a:t>
+              <a:t>10/28/24</a:t>
             </a:fld>
             <a:endParaRPr lang="en-US"/>
           </a:p>
@@ -6526,7 +6526,7 @@
           <a:p>
             <a:fld id="{D753EFC8-4232-4598-94F6-94C0EBAFC469}" type="datetime1">
               <a:rPr lang="en-US" smtClean="0"/>
-              <a:t>10/29/23</a:t>
+              <a:t>10/28/24</a:t>
             </a:fld>
             <a:endParaRPr lang="en-US"/>
           </a:p>
@@ -6980,7 +6980,7 @@
           <a:p>
             <a:fld id="{D753EFC8-4232-4598-94F6-94C0EBAFC469}" type="datetime1">
               <a:rPr lang="en-US" smtClean="0"/>
-              <a:t>10/29/23</a:t>
+              <a:t>10/28/24</a:t>
             </a:fld>
             <a:endParaRPr lang="en-US"/>
           </a:p>
@@ -7528,7 +7528,7 @@
           <a:p>
             <a:fld id="{D753EFC8-4232-4598-94F6-94C0EBAFC469}" type="datetime1">
               <a:rPr lang="en-US" smtClean="0"/>
-              <a:t>10/29/23</a:t>
+              <a:t>10/28/24</a:t>
             </a:fld>
             <a:endParaRPr lang="en-US"/>
           </a:p>
@@ -7988,7 +7988,7 @@
           <a:p>
             <a:fld id="{D753EFC8-4232-4598-94F6-94C0EBAFC469}" type="datetime1">
               <a:rPr lang="en-US" smtClean="0"/>
-              <a:t>10/29/23</a:t>
+              <a:t>10/28/24</a:t>
             </a:fld>
             <a:endParaRPr lang="en-US"/>
           </a:p>
@@ -8095,7 +8095,7 @@
           <a:p>
             <a:fld id="{6700A58B-DD98-43D0-B791-721480A02982}" type="datetime1">
               <a:rPr lang="en-US" smtClean="0"/>
-              <a:t>10/29/23</a:t>
+              <a:t>10/28/24</a:t>
             </a:fld>
             <a:endParaRPr lang="en-US"/>
           </a:p>
@@ -9503,7 +9503,7 @@
           <a:p>
             <a:fld id="{D753EFC8-4232-4598-94F6-94C0EBAFC469}" type="datetime1">
               <a:rPr lang="en-US" smtClean="0"/>
-              <a:t>10/29/23</a:t>
+              <a:t>10/28/24</a:t>
             </a:fld>
             <a:endParaRPr lang="en-US"/>
           </a:p>
@@ -9982,7 +9982,7 @@
           <a:p>
             <a:fld id="{D753EFC8-4232-4598-94F6-94C0EBAFC469}" type="datetime1">
               <a:rPr lang="en-US" smtClean="0"/>
-              <a:t>10/29/23</a:t>
+              <a:t>10/28/24</a:t>
             </a:fld>
             <a:endParaRPr lang="en-US"/>
           </a:p>
@@ -10333,7 +10333,7 @@
           <a:p>
             <a:fld id="{D753EFC8-4232-4598-94F6-94C0EBAFC469}" type="datetime1">
               <a:rPr lang="en-US" smtClean="0"/>
-              <a:t>10/29/23</a:t>
+              <a:t>10/28/24</a:t>
             </a:fld>
             <a:endParaRPr lang="en-US"/>
           </a:p>
@@ -10446,7 +10446,7 @@
           <a:p>
             <a:fld id="{6700A58B-DD98-43D0-B791-721480A02982}" type="datetime1">
               <a:rPr lang="en-US" smtClean="0"/>
-              <a:t>10/29/23</a:t>
+              <a:t>10/28/24</a:t>
             </a:fld>
             <a:endParaRPr lang="en-US"/>
           </a:p>
@@ -11221,7 +11221,7 @@
           <a:p>
             <a:fld id="{D753EFC8-4232-4598-94F6-94C0EBAFC469}" type="datetime1">
               <a:rPr lang="en-US" smtClean="0"/>
-              <a:t>10/29/23</a:t>
+              <a:t>10/28/24</a:t>
             </a:fld>
             <a:endParaRPr lang="en-US"/>
           </a:p>
@@ -11382,7 +11382,7 @@
           <a:p>
             <a:fld id="{D753EFC8-4232-4598-94F6-94C0EBAFC469}" type="datetime1">
               <a:rPr lang="en-US" smtClean="0"/>
-              <a:t>10/29/23</a:t>
+              <a:t>10/28/24</a:t>
             </a:fld>
             <a:endParaRPr lang="en-US"/>
           </a:p>
@@ -11679,7 +11679,7 @@
           <a:p>
             <a:fld id="{D753EFC8-4232-4598-94F6-94C0EBAFC469}" type="datetime1">
               <a:rPr lang="en-US" smtClean="0"/>
-              <a:t>10/29/23</a:t>
+              <a:t>10/28/24</a:t>
             </a:fld>
             <a:endParaRPr lang="en-US"/>
           </a:p>
@@ -12664,7 +12664,7 @@
           <a:p>
             <a:fld id="{D753EFC8-4232-4598-94F6-94C0EBAFC469}" type="datetime1">
               <a:rPr lang="en-US" smtClean="0"/>
-              <a:t>10/29/23</a:t>
+              <a:t>10/28/24</a:t>
             </a:fld>
             <a:endParaRPr lang="en-US"/>
           </a:p>
@@ -13176,7 +13176,7 @@
           <a:p>
             <a:fld id="{D753EFC8-4232-4598-94F6-94C0EBAFC469}" type="datetime1">
               <a:rPr lang="en-US" smtClean="0"/>
-              <a:t>10/29/23</a:t>
+              <a:t>10/28/24</a:t>
             </a:fld>
             <a:endParaRPr lang="en-US"/>
           </a:p>
@@ -13305,7 +13305,7 @@
           <a:p>
             <a:fld id="{D753EFC8-4232-4598-94F6-94C0EBAFC469}" type="datetime1">
               <a:rPr lang="en-US" smtClean="0"/>
-              <a:t>10/29/23</a:t>
+              <a:t>10/28/24</a:t>
             </a:fld>
             <a:endParaRPr lang="en-US"/>
           </a:p>
@@ -13634,7 +13634,7 @@
           <a:p>
             <a:fld id="{D753EFC8-4232-4598-94F6-94C0EBAFC469}" type="datetime1">
               <a:rPr lang="en-US" smtClean="0"/>
-              <a:t>10/29/23</a:t>
+              <a:t>10/28/24</a:t>
             </a:fld>
             <a:endParaRPr lang="en-US"/>
           </a:p>
@@ -13933,7 +13933,7 @@
           <a:p>
             <a:fld id="{D753EFC8-4232-4598-94F6-94C0EBAFC469}" type="datetime1">
               <a:rPr lang="en-US" smtClean="0"/>
-              <a:t>10/29/23</a:t>
+              <a:t>10/28/24</a:t>
             </a:fld>
             <a:endParaRPr lang="en-US"/>
           </a:p>
@@ -14151,7 +14151,7 @@
           <a:p>
             <a:fld id="{D753EFC8-4232-4598-94F6-94C0EBAFC469}" type="datetime1">
               <a:rPr lang="en-US" smtClean="0"/>
-              <a:t>10/29/23</a:t>
+              <a:t>10/28/24</a:t>
             </a:fld>
             <a:endParaRPr lang="en-US"/>
           </a:p>
@@ -14371,7 +14371,7 @@
           <a:p>
             <a:fld id="{D753EFC8-4232-4598-94F6-94C0EBAFC469}" type="datetime1">
               <a:rPr lang="en-US" smtClean="0"/>
-              <a:t>10/29/23</a:t>
+              <a:t>10/28/24</a:t>
             </a:fld>
             <a:endParaRPr lang="en-US"/>
           </a:p>
@@ -14714,7 +14714,7 @@
           <a:p>
             <a:fld id="{6700A58B-DD98-43D0-B791-721480A02982}" type="datetime1">
               <a:rPr lang="en-US" smtClean="0"/>
-              <a:t>10/29/23</a:t>
+              <a:t>10/28/24</a:t>
             </a:fld>
             <a:endParaRPr lang="en-US"/>
           </a:p>
@@ -15264,7 +15264,7 @@
           <a:p>
             <a:fld id="{D753EFC8-4232-4598-94F6-94C0EBAFC469}" type="datetime1">
               <a:rPr lang="en-US" smtClean="0"/>
-              <a:t>10/29/23</a:t>
+              <a:t>10/28/24</a:t>
             </a:fld>
             <a:endParaRPr lang="en-US"/>
           </a:p>
@@ -15652,7 +15652,7 @@
           <a:p>
             <a:fld id="{D753EFC8-4232-4598-94F6-94C0EBAFC469}" type="datetime1">
               <a:rPr lang="en-US" smtClean="0"/>
-              <a:t>10/29/23</a:t>
+              <a:t>10/28/24</a:t>
             </a:fld>
             <a:endParaRPr lang="en-US"/>
           </a:p>
@@ -16157,7 +16157,7 @@
           <a:p>
             <a:fld id="{D753EFC8-4232-4598-94F6-94C0EBAFC469}" type="datetime1">
               <a:rPr lang="en-US" smtClean="0"/>
-              <a:t>10/29/23</a:t>
+              <a:t>10/28/24</a:t>
             </a:fld>
             <a:endParaRPr lang="en-US"/>
           </a:p>
@@ -16503,7 +16503,7 @@
           <a:p>
             <a:fld id="{D753EFC8-4232-4598-94F6-94C0EBAFC469}" type="datetime1">
               <a:rPr lang="en-US" smtClean="0"/>
-              <a:t>10/29/23</a:t>
+              <a:t>10/28/24</a:t>
             </a:fld>
             <a:endParaRPr lang="en-US"/>
           </a:p>
@@ -17098,7 +17098,7 @@
           <a:p>
             <a:fld id="{D753EFC8-4232-4598-94F6-94C0EBAFC469}" type="datetime1">
               <a:rPr lang="en-US" smtClean="0"/>
-              <a:t>10/29/23</a:t>
+              <a:t>10/28/24</a:t>
             </a:fld>
             <a:endParaRPr lang="en-US"/>
           </a:p>
@@ -17266,7 +17266,7 @@
           <a:p>
             <a:fld id="{D753EFC8-4232-4598-94F6-94C0EBAFC469}" type="datetime1">
               <a:rPr lang="en-US" smtClean="0"/>
-              <a:t>10/29/23</a:t>
+              <a:t>10/28/24</a:t>
             </a:fld>
             <a:endParaRPr lang="en-US"/>
           </a:p>
@@ -17656,7 +17656,7 @@
           <a:p>
             <a:fld id="{D753EFC8-4232-4598-94F6-94C0EBAFC469}" type="datetime1">
               <a:rPr lang="en-US" smtClean="0"/>
-              <a:t>10/29/23</a:t>
+              <a:t>10/28/24</a:t>
             </a:fld>
             <a:endParaRPr lang="en-US"/>
           </a:p>
@@ -18048,7 +18048,7 @@
           <a:p>
             <a:fld id="{D753EFC8-4232-4598-94F6-94C0EBAFC469}" type="datetime1">
               <a:rPr lang="en-US" smtClean="0"/>
-              <a:t>10/29/23</a:t>
+              <a:t>10/28/24</a:t>
             </a:fld>
             <a:endParaRPr lang="en-US"/>
           </a:p>
@@ -18579,7 +18579,7 @@
           <a:p>
             <a:fld id="{D753EFC8-4232-4598-94F6-94C0EBAFC469}" type="datetime1">
               <a:rPr lang="en-US" smtClean="0"/>
-              <a:t>10/29/23</a:t>
+              <a:t>10/28/24</a:t>
             </a:fld>
             <a:endParaRPr lang="en-US"/>
           </a:p>
@@ -18869,7 +18869,7 @@
           <a:p>
             <a:fld id="{D753EFC8-4232-4598-94F6-94C0EBAFC469}" type="datetime1">
               <a:rPr lang="en-US" smtClean="0"/>
-              <a:t>10/29/23</a:t>
+              <a:t>10/28/24</a:t>
             </a:fld>
             <a:endParaRPr lang="en-US"/>
           </a:p>
@@ -19143,7 +19143,7 @@
           <a:p>
             <a:fld id="{6700A58B-DD98-43D0-B791-721480A02982}" type="datetime1">
               <a:rPr lang="en-US" smtClean="0"/>
-              <a:t>10/29/23</a:t>
+              <a:t>10/28/24</a:t>
             </a:fld>
             <a:endParaRPr lang="en-US"/>
           </a:p>
@@ -19646,7 +19646,7 @@
           <a:p>
             <a:fld id="{D753EFC8-4232-4598-94F6-94C0EBAFC469}" type="datetime1">
               <a:rPr lang="en-US" smtClean="0"/>
-              <a:t>10/29/23</a:t>
+              <a:t>10/28/24</a:t>
             </a:fld>
             <a:endParaRPr lang="en-US"/>
           </a:p>
@@ -20026,7 +20026,7 @@
           <a:p>
             <a:fld id="{D753EFC8-4232-4598-94F6-94C0EBAFC469}" type="datetime1">
               <a:rPr lang="en-US" smtClean="0"/>
-              <a:t>10/29/23</a:t>
+              <a:t>10/28/24</a:t>
             </a:fld>
             <a:endParaRPr lang="en-US"/>
           </a:p>
@@ -20291,7 +20291,7 @@
           <a:p>
             <a:fld id="{D753EFC8-4232-4598-94F6-94C0EBAFC469}" type="datetime1">
               <a:rPr lang="en-US" smtClean="0"/>
-              <a:t>10/29/23</a:t>
+              <a:t>10/28/24</a:t>
             </a:fld>
             <a:endParaRPr lang="en-US"/>
           </a:p>
@@ -20411,7 +20411,7 @@
           <a:p>
             <a:fld id="{D753EFC8-4232-4598-94F6-94C0EBAFC469}" type="datetime1">
               <a:rPr lang="en-US" smtClean="0"/>
-              <a:t>10/29/23</a:t>
+              <a:t>10/28/24</a:t>
             </a:fld>
             <a:endParaRPr lang="en-US"/>
           </a:p>
@@ -21128,7 +21128,7 @@
           <a:p>
             <a:fld id="{D753EFC8-4232-4598-94F6-94C0EBAFC469}" type="datetime1">
               <a:rPr lang="en-US" smtClean="0"/>
-              <a:t>10/29/23</a:t>
+              <a:t>10/28/24</a:t>
             </a:fld>
             <a:endParaRPr lang="en-US"/>
           </a:p>
@@ -22080,7 +22080,7 @@
           <a:p>
             <a:fld id="{D753EFC8-4232-4598-94F6-94C0EBAFC469}" type="datetime1">
               <a:rPr lang="en-US" smtClean="0"/>
-              <a:t>10/29/23</a:t>
+              <a:t>10/28/24</a:t>
             </a:fld>
             <a:endParaRPr lang="en-US"/>
           </a:p>
@@ -23078,7 +23078,7 @@
           <a:p>
             <a:fld id="{D753EFC8-4232-4598-94F6-94C0EBAFC469}" type="datetime1">
               <a:rPr lang="en-US" smtClean="0"/>
-              <a:t>10/29/23</a:t>
+              <a:t>10/28/24</a:t>
             </a:fld>
             <a:endParaRPr lang="en-US"/>
           </a:p>
@@ -23247,8 +23247,8 @@
         </p:nvSpPr>
         <p:spPr>
           <a:xfrm>
-            <a:off x="1984267" y="2944296"/>
-            <a:ext cx="5473808" cy="1846659"/>
+            <a:off x="2042018" y="2718170"/>
+            <a:ext cx="5473808" cy="2400657"/>
           </a:xfrm>
           <a:prstGeom prst="rect">
             <a:avLst/>
@@ -23274,9 +23274,26 @@
               <a:buFont typeface="Arial" panose="020B0604020202020204" pitchFamily="34" charset="0"/>
               <a:buChar char="•"/>
             </a:pPr>
-            <a:r>
-              <a:rPr lang="en-US" dirty="0"/>
-              <a:t>0 = more weight is given to observations from the more distant past</a:t>
+            <a:endParaRPr lang="en-US" dirty="0"/>
+          </a:p>
+          <a:p>
+            <a:pPr marL="742950" lvl="1" indent="-285750">
+              <a:buFont typeface="Arial" panose="020B0604020202020204" pitchFamily="34" charset="0"/>
+              <a:buChar char="•"/>
+            </a:pPr>
+            <a:r>
+              <a:rPr lang="en-US" dirty="0"/>
+              <a:t>0= all records are even, so just naïve mean</a:t>
+            </a:r>
+          </a:p>
+          <a:p>
+            <a:pPr marL="742950" lvl="1" indent="-285750">
+              <a:buFont typeface="Arial" panose="020B0604020202020204" pitchFamily="34" charset="0"/>
+              <a:buChar char="•"/>
+            </a:pPr>
+            <a:r>
+              <a:rPr lang="en-US" dirty="0"/>
+              <a:t>Approaching 0 = more weight is given to observations from the more distant past</a:t>
             </a:r>
           </a:p>
           <a:p>
@@ -23375,7 +23392,7 @@
           <a:p>
             <a:fld id="{D753EFC8-4232-4598-94F6-94C0EBAFC469}" type="datetime1">
               <a:rPr lang="en-US" smtClean="0"/>
-              <a:t>10/29/23</a:t>
+              <a:t>10/28/24</a:t>
             </a:fld>
             <a:endParaRPr lang="en-US"/>
           </a:p>
@@ -24312,7 +24329,7 @@
           <a:p>
             <a:fld id="{D753EFC8-4232-4598-94F6-94C0EBAFC469}" type="datetime1">
               <a:rPr lang="en-US" smtClean="0"/>
-              <a:t>10/29/23</a:t>
+              <a:t>10/28/24</a:t>
             </a:fld>
             <a:endParaRPr lang="en-US"/>
           </a:p>
@@ -24557,7 +24574,7 @@
           <a:p>
             <a:fld id="{6700A58B-DD98-43D0-B791-721480A02982}" type="datetime1">
               <a:rPr lang="en-US" smtClean="0"/>
-              <a:t>10/29/23</a:t>
+              <a:t>10/28/24</a:t>
             </a:fld>
             <a:endParaRPr lang="en-US"/>
           </a:p>
@@ -25076,7 +25093,7 @@
           <a:p>
             <a:fld id="{6700A58B-DD98-43D0-B791-721480A02982}" type="datetime1">
               <a:rPr lang="en-US" smtClean="0"/>
-              <a:t>10/29/23</a:t>
+              <a:t>10/28/24</a:t>
             </a:fld>
             <a:endParaRPr lang="en-US"/>
           </a:p>
@@ -26256,7 +26273,7 @@
           <a:p>
             <a:fld id="{6700A58B-DD98-43D0-B791-721480A02982}" type="datetime1">
               <a:rPr lang="en-US" smtClean="0"/>
-              <a:t>10/29/23</a:t>
+              <a:t>10/28/24</a:t>
             </a:fld>
             <a:endParaRPr lang="en-US"/>
           </a:p>
@@ -26589,7 +26606,7 @@
           <a:p>
             <a:fld id="{6700A58B-DD98-43D0-B791-721480A02982}" type="datetime1">
               <a:rPr lang="en-US" smtClean="0"/>
-              <a:t>10/29/23</a:t>
+              <a:t>10/28/24</a:t>
             </a:fld>
             <a:endParaRPr lang="en-US"/>
           </a:p>

</xml_diff>